<commit_message>
batch file to run war in tomcat addition
</commit_message>
<xml_diff>
--- a/240830_프레젠테이션.pptx
+++ b/240830_프레젠테이션.pptx
@@ -16,6 +16,7 @@
     <p:sldId id="264" r:id="rId10"/>
     <p:sldId id="266" r:id="rId11"/>
     <p:sldId id="258" r:id="rId12"/>
+    <p:sldId id="267" r:id="rId13"/>
   </p:sldIdLst>
   <p:sldSz cx="12192000" cy="6858000"/>
   <p:notesSz cx="6858000" cy="9144000"/>
@@ -114,6 +115,11 @@
       </a:defRPr>
     </a:lvl9pPr>
   </p:defaultTextStyle>
+  <p:extLst>
+    <p:ext uri="{EFAFB233-063F-42B5-8137-9DF3F51BA10A}">
+      <p15:sldGuideLst xmlns:p15="http://schemas.microsoft.com/office/powerpoint/2012/main"/>
+    </p:ext>
+  </p:extLst>
 </p:presentation>
 </file>
 
@@ -4172,6 +4178,254 @@
 </p:sld>
 </file>
 
+<file path=ppt/slides/slide12.xml><?xml version="1.0" encoding="utf-8"?>
+<p:sld xmlns:a="http://schemas.openxmlformats.org/drawingml/2006/main" xmlns:r="http://schemas.openxmlformats.org/officeDocument/2006/relationships" xmlns:p="http://schemas.openxmlformats.org/presentationml/2006/main">
+  <p:cSld>
+    <p:spTree>
+      <p:nvGrpSpPr>
+        <p:cNvPr id="1" name=""/>
+        <p:cNvGrpSpPr/>
+        <p:nvPr/>
+      </p:nvGrpSpPr>
+      <p:grpSpPr>
+        <a:xfrm>
+          <a:off x="0" y="0"/>
+          <a:ext cx="0" cy="0"/>
+          <a:chOff x="0" y="0"/>
+          <a:chExt cx="0" cy="0"/>
+        </a:xfrm>
+      </p:grpSpPr>
+      <p:sp>
+        <p:nvSpPr>
+          <p:cNvPr id="2" name="제목 1">
+            <a:extLst>
+              <a:ext uri="{FF2B5EF4-FFF2-40B4-BE49-F238E27FC236}">
+                <a16:creationId xmlns:a16="http://schemas.microsoft.com/office/drawing/2014/main" id="{F8164310-7CF0-BC26-CF62-84C6062C21A6}"/>
+              </a:ext>
+            </a:extLst>
+          </p:cNvPr>
+          <p:cNvSpPr>
+            <a:spLocks noGrp="1"/>
+          </p:cNvSpPr>
+          <p:nvPr>
+            <p:ph type="title"/>
+          </p:nvPr>
+        </p:nvSpPr>
+        <p:spPr/>
+        <p:txBody>
+          <a:bodyPr>
+            <a:normAutofit/>
+          </a:bodyPr>
+          <a:lstStyle/>
+          <a:p>
+            <a:r>
+              <a:rPr lang="ko-KR" altLang="en-US" sz="2400" dirty="0"/>
+              <a:t>배치 파일</a:t>
+            </a:r>
+          </a:p>
+        </p:txBody>
+      </p:sp>
+      <p:sp>
+        <p:nvSpPr>
+          <p:cNvPr id="3" name="내용 개체 틀 2">
+            <a:extLst>
+              <a:ext uri="{FF2B5EF4-FFF2-40B4-BE49-F238E27FC236}">
+                <a16:creationId xmlns:a16="http://schemas.microsoft.com/office/drawing/2014/main" id="{8F4486E5-B4EE-8DE9-0937-B284FC0E9889}"/>
+              </a:ext>
+            </a:extLst>
+          </p:cNvPr>
+          <p:cNvSpPr>
+            <a:spLocks noGrp="1"/>
+          </p:cNvSpPr>
+          <p:nvPr>
+            <p:ph idx="1"/>
+          </p:nvPr>
+        </p:nvSpPr>
+        <p:spPr/>
+        <p:txBody>
+          <a:bodyPr>
+            <a:normAutofit/>
+          </a:bodyPr>
+          <a:lstStyle/>
+          <a:p>
+            <a:r>
+              <a:rPr lang="ko-KR" altLang="en-US" sz="1500" dirty="0"/>
+              <a:t>배치 파일은 여러 명령어를 순차적으로 실행할 수 있는 스크립트 파일이다</a:t>
+            </a:r>
+            <a:r>
+              <a:rPr lang="en-US" altLang="ko-KR" sz="1500" dirty="0"/>
+              <a:t>. </a:t>
+            </a:r>
+            <a:r>
+              <a:rPr lang="ko-KR" altLang="en-US" sz="1500" dirty="0"/>
+              <a:t>주로 </a:t>
+            </a:r>
+            <a:r>
+              <a:rPr lang="en-US" altLang="ko-KR" sz="1500" dirty="0"/>
+              <a:t>Windows </a:t>
+            </a:r>
+            <a:r>
+              <a:rPr lang="ko-KR" altLang="en-US" sz="1500" dirty="0"/>
+              <a:t>운영 체제에서 사용되며</a:t>
+            </a:r>
+            <a:r>
+              <a:rPr lang="en-US" altLang="ko-KR" sz="1500" dirty="0"/>
+              <a:t>, </a:t>
+            </a:r>
+            <a:r>
+              <a:rPr lang="ko-KR" altLang="en-US" sz="1500" dirty="0"/>
+              <a:t>파일 확장자는 </a:t>
+            </a:r>
+            <a:r>
+              <a:rPr lang="en-US" altLang="ko-KR" sz="1500" dirty="0"/>
+              <a:t>.bat </a:t>
+            </a:r>
+            <a:r>
+              <a:rPr lang="ko-KR" altLang="en-US" sz="1500" dirty="0"/>
+              <a:t>또는 </a:t>
+            </a:r>
+            <a:r>
+              <a:rPr lang="en-US" altLang="ko-KR" sz="1500" dirty="0"/>
+              <a:t>.</a:t>
+            </a:r>
+            <a:r>
+              <a:rPr lang="en-US" altLang="ko-KR" sz="1500" dirty="0" err="1"/>
+              <a:t>cmd</a:t>
+            </a:r>
+            <a:r>
+              <a:rPr lang="ko-KR" altLang="en-US" sz="1500" dirty="0"/>
+              <a:t>이다</a:t>
+            </a:r>
+            <a:r>
+              <a:rPr lang="en-US" altLang="ko-KR" sz="1500" dirty="0"/>
+              <a:t>.</a:t>
+            </a:r>
+          </a:p>
+          <a:p>
+            <a:r>
+              <a:rPr lang="ko-KR" altLang="en-US" sz="1500" dirty="0"/>
+              <a:t>배치 파일은 </a:t>
+            </a:r>
+            <a:r>
+              <a:rPr lang="en-US" altLang="ko-KR" sz="1500" dirty="0"/>
+              <a:t>DOS </a:t>
+            </a:r>
+            <a:r>
+              <a:rPr lang="ko-KR" altLang="en-US" sz="1500" dirty="0"/>
+              <a:t>명령어를 기반으로 하며</a:t>
+            </a:r>
+            <a:r>
+              <a:rPr lang="en-US" altLang="ko-KR" sz="1500" dirty="0"/>
+              <a:t>, </a:t>
+            </a:r>
+            <a:r>
+              <a:rPr lang="ko-KR" altLang="en-US" sz="1500" dirty="0"/>
+              <a:t>반복적으로 사용해야 하는 명령어들을 한 번에 실행하거나</a:t>
+            </a:r>
+            <a:r>
+              <a:rPr lang="en-US" altLang="ko-KR" sz="1500" dirty="0"/>
+              <a:t>, </a:t>
+            </a:r>
+            <a:r>
+              <a:rPr lang="ko-KR" altLang="en-US" sz="1500" dirty="0"/>
+              <a:t>자동화 작업을 수행하는데 매우 유용하다</a:t>
+            </a:r>
+            <a:r>
+              <a:rPr lang="en-US" altLang="ko-KR" sz="1500" dirty="0"/>
+              <a:t>.</a:t>
+            </a:r>
+          </a:p>
+          <a:p>
+            <a:endParaRPr lang="en-US" altLang="ko-KR" sz="1500" dirty="0"/>
+          </a:p>
+          <a:p>
+            <a:r>
+              <a:rPr lang="en-US" altLang="ko-KR" sz="1500" dirty="0" err="1"/>
+              <a:t>Setlocal</a:t>
+            </a:r>
+            <a:r>
+              <a:rPr lang="en-US" altLang="ko-KR" sz="1500" dirty="0"/>
+              <a:t>: </a:t>
+            </a:r>
+            <a:r>
+              <a:rPr lang="ko-KR" altLang="en-US" sz="1500" dirty="0"/>
+              <a:t>배치</a:t>
+            </a:r>
+            <a:r>
+              <a:rPr lang="en-US" altLang="ko-KR" sz="1500" dirty="0"/>
+              <a:t> </a:t>
+            </a:r>
+            <a:r>
+              <a:rPr lang="ko-KR" altLang="en-US" sz="1500" dirty="0"/>
+              <a:t>파일 내에서 정의된 환경 변수들이 배치 파일이 종료된 후에도 시스템 전체에 영향을 미치지 않도록 로컬 환경을 설정한다</a:t>
+            </a:r>
+            <a:r>
+              <a:rPr lang="en-US" altLang="ko-KR" sz="1500" dirty="0"/>
+              <a:t>. </a:t>
+            </a:r>
+            <a:r>
+              <a:rPr lang="ko-KR" altLang="en-US" sz="1500" dirty="0"/>
+              <a:t>즉</a:t>
+            </a:r>
+            <a:r>
+              <a:rPr lang="en-US" altLang="ko-KR" sz="1500" dirty="0"/>
+              <a:t>, </a:t>
+            </a:r>
+            <a:r>
+              <a:rPr lang="ko-KR" altLang="en-US" sz="1500" dirty="0"/>
+              <a:t>이 배치 파일에서 설정된 변수들은 배치 파일이 끝나면 사라진다</a:t>
+            </a:r>
+            <a:r>
+              <a:rPr lang="en-US" altLang="ko-KR" sz="1500" dirty="0"/>
+              <a:t>.</a:t>
+            </a:r>
+          </a:p>
+          <a:p>
+            <a:r>
+              <a:rPr lang="en-US" altLang="ko-KR" sz="1500" dirty="0" err="1"/>
+              <a:t>Endlocal</a:t>
+            </a:r>
+            <a:r>
+              <a:rPr lang="en-US" altLang="ko-KR" sz="1500" dirty="0"/>
+              <a:t>: </a:t>
+            </a:r>
+            <a:r>
+              <a:rPr lang="en-US" altLang="ko-KR" sz="1500" dirty="0" err="1"/>
+              <a:t>setlocal</a:t>
+            </a:r>
+            <a:r>
+              <a:rPr lang="ko-KR" altLang="en-US" sz="1500" dirty="0"/>
+              <a:t>로 설정된 로컬 환경 변수를 해제한다</a:t>
+            </a:r>
+            <a:r>
+              <a:rPr lang="en-US" altLang="ko-KR" sz="1500" dirty="0"/>
+              <a:t>. </a:t>
+            </a:r>
+            <a:r>
+              <a:rPr lang="ko-KR" altLang="en-US" sz="1500" dirty="0"/>
+              <a:t>배치 파일이 종료되면서 이 안에서 설정된 환경 변수들이 시스템에 영향을 주지 않도록 한다</a:t>
+            </a:r>
+            <a:r>
+              <a:rPr lang="en-US" altLang="ko-KR" sz="1500" dirty="0"/>
+              <a:t>.</a:t>
+            </a:r>
+            <a:endParaRPr lang="ko-KR" altLang="en-US" sz="1500" dirty="0"/>
+          </a:p>
+        </p:txBody>
+      </p:sp>
+    </p:spTree>
+    <p:extLst>
+      <p:ext uri="{BB962C8B-B14F-4D97-AF65-F5344CB8AC3E}">
+        <p14:creationId xmlns:p14="http://schemas.microsoft.com/office/powerpoint/2010/main" val="3286651729"/>
+      </p:ext>
+    </p:extLst>
+  </p:cSld>
+  <p:clrMapOvr>
+    <a:masterClrMapping/>
+  </p:clrMapOvr>
+</p:sld>
+</file>
+
 <file path=ppt/slides/slide2.xml><?xml version="1.0" encoding="utf-8"?>
 <p:sld xmlns:a="http://schemas.openxmlformats.org/drawingml/2006/main" xmlns:r="http://schemas.openxmlformats.org/officeDocument/2006/relationships" xmlns:p="http://schemas.openxmlformats.org/presentationml/2006/main">
   <p:cSld>
@@ -6068,6 +6322,97 @@
             <a:r>
               <a:rPr lang="en-US" altLang="ko-KR" sz="1500" dirty="0"/>
               <a:t>.</a:t>
+            </a:r>
+          </a:p>
+          <a:p>
+            <a:pPr marL="0" indent="0">
+              <a:buNone/>
+            </a:pPr>
+            <a:endParaRPr lang="en-US" altLang="ko-KR" sz="1500" dirty="0"/>
+          </a:p>
+          <a:p>
+            <a:pPr marL="0" indent="0">
+              <a:buNone/>
+            </a:pPr>
+            <a:r>
+              <a:rPr lang="ko-KR" altLang="en-US" sz="1500" dirty="0"/>
+              <a:t>설치 방법</a:t>
+            </a:r>
+            <a:r>
+              <a:rPr lang="en-US" altLang="ko-KR" sz="1500" dirty="0"/>
+              <a:t>: </a:t>
+            </a:r>
+            <a:r>
+              <a:rPr lang="en-US" altLang="ko-KR" sz="1500" dirty="0" err="1"/>
+              <a:t>cmd</a:t>
+            </a:r>
+            <a:r>
+              <a:rPr lang="en-US" altLang="ko-KR" sz="1500" dirty="0"/>
+              <a:t>, terminal</a:t>
+            </a:r>
+            <a:r>
+              <a:rPr lang="ko-KR" altLang="en-US" sz="1500" dirty="0"/>
+              <a:t>에서 다음과 같이 입력한다</a:t>
+            </a:r>
+            <a:r>
+              <a:rPr lang="en-US" altLang="ko-KR" sz="1500" dirty="0"/>
+              <a:t>. </a:t>
+            </a:r>
+            <a:r>
+              <a:rPr lang="en-US" altLang="ko-KR" sz="1500" dirty="0" err="1"/>
+              <a:t>Mvn</a:t>
+            </a:r>
+            <a:r>
+              <a:rPr lang="en-US" altLang="ko-KR" sz="1500" dirty="0"/>
+              <a:t> </a:t>
+            </a:r>
+            <a:r>
+              <a:rPr lang="en-US" altLang="ko-KR" sz="1500" dirty="0" err="1"/>
+              <a:t>install:install-file</a:t>
+            </a:r>
+            <a:r>
+              <a:rPr lang="en-US" altLang="ko-KR" sz="1500" dirty="0"/>
+              <a:t> -</a:t>
+            </a:r>
+            <a:r>
+              <a:rPr lang="en-US" altLang="ko-KR" sz="1500" dirty="0" err="1"/>
+              <a:t>Dfile</a:t>
+            </a:r>
+            <a:r>
+              <a:rPr lang="en-US" altLang="ko-KR" sz="1500" dirty="0"/>
+              <a:t>=&lt;path-to-file&gt; -</a:t>
+            </a:r>
+            <a:r>
+              <a:rPr lang="en-US" altLang="ko-KR" sz="1500" dirty="0" err="1"/>
+              <a:t>DgroupId</a:t>
+            </a:r>
+            <a:r>
+              <a:rPr lang="en-US" altLang="ko-KR" sz="1500" dirty="0"/>
+              <a:t>=&lt;group-id&gt; -</a:t>
+            </a:r>
+            <a:r>
+              <a:rPr lang="en-US" altLang="ko-KR" sz="1500" dirty="0" err="1"/>
+              <a:t>DartifactId</a:t>
+            </a:r>
+            <a:r>
+              <a:rPr lang="en-US" altLang="ko-KR" sz="1500" dirty="0"/>
+              <a:t>=&lt;artifact-id&gt; -</a:t>
+            </a:r>
+            <a:r>
+              <a:rPr lang="en-US" altLang="ko-KR" sz="1500" dirty="0" err="1"/>
+              <a:t>Dversion</a:t>
+            </a:r>
+            <a:r>
+              <a:rPr lang="en-US" altLang="ko-KR" sz="1500" dirty="0"/>
+              <a:t>=&lt;version&gt; -</a:t>
+            </a:r>
+            <a:r>
+              <a:rPr lang="en-US" altLang="ko-KR" sz="1500" dirty="0" err="1"/>
+              <a:t>Dpackaging</a:t>
+            </a:r>
+            <a:r>
+              <a:rPr lang="en-US" altLang="ko-KR" sz="1500" dirty="0"/>
+              <a:t>=jar</a:t>
             </a:r>
             <a:endParaRPr lang="ko-KR" altLang="en-US" sz="1500" dirty="0"/>
           </a:p>

</xml_diff>